<commit_message>
Week 3 section ppt: reporting statistics slide
</commit_message>
<xml_diff>
--- a/Week3/ppt_section3.pptx
+++ b/Week3/ppt_section3.pptx
@@ -8,6 +8,7 @@
     <p:sldId id="258" r:id="rId2"/>
     <p:sldId id="261" r:id="rId3"/>
     <p:sldId id="260" r:id="rId4"/>
+    <p:sldId id="262" r:id="rId5"/>
   </p:sldIdLst>
   <p:sldSz cx="9144000" cy="6858000" type="screen4x3"/>
   <p:notesSz cx="6858000" cy="9144000"/>
@@ -3764,6 +3765,84 @@
 </p:sld>
 </file>
 
+<file path=ppt/slides/slide4.xml><?xml version="1.0" encoding="utf-8"?>
+<p:sld xmlns:a="http://schemas.openxmlformats.org/drawingml/2006/main" xmlns:r="http://schemas.openxmlformats.org/officeDocument/2006/relationships" xmlns:p="http://schemas.openxmlformats.org/presentationml/2006/main">
+  <p:cSld>
+    <p:spTree>
+      <p:nvGrpSpPr>
+        <p:cNvPr id="1" name=""/>
+        <p:cNvGrpSpPr/>
+        <p:nvPr/>
+      </p:nvGrpSpPr>
+      <p:grpSpPr>
+        <a:xfrm>
+          <a:off x="0" y="0"/>
+          <a:ext cx="0" cy="0"/>
+          <a:chOff x="0" y="0"/>
+          <a:chExt cx="0" cy="0"/>
+        </a:xfrm>
+      </p:grpSpPr>
+      <p:sp>
+        <p:nvSpPr>
+          <p:cNvPr id="2" name="Title 1"/>
+          <p:cNvSpPr>
+            <a:spLocks noGrp="1"/>
+          </p:cNvSpPr>
+          <p:nvPr>
+            <p:ph type="title"/>
+          </p:nvPr>
+        </p:nvSpPr>
+        <p:spPr/>
+        <p:txBody>
+          <a:bodyPr/>
+          <a:lstStyle/>
+          <a:p>
+            <a:r>
+              <a:rPr lang="en-US" dirty="0" smtClean="0"/>
+              <a:t>Reporting Statistics</a:t>
+            </a:r>
+            <a:endParaRPr lang="en-US" dirty="0"/>
+          </a:p>
+        </p:txBody>
+      </p:sp>
+      <p:pic>
+        <p:nvPicPr>
+          <p:cNvPr id="4" name="Content Placeholder 3" descr="Screen Shot 2013-10-09 at 1.21.49 PM.png"/>
+          <p:cNvPicPr>
+            <a:picLocks noGrp="1" noChangeAspect="1"/>
+          </p:cNvPicPr>
+          <p:nvPr>
+            <p:ph idx="1"/>
+          </p:nvPr>
+        </p:nvPicPr>
+        <p:blipFill>
+          <a:blip r:embed="rId2">
+            <a:extLst>
+              <a:ext uri="{28A0092B-C50C-407E-A947-70E740481C1C}">
+                <a14:useLocalDpi xmlns:a14="http://schemas.microsoft.com/office/drawing/2010/main" val="0"/>
+              </a:ext>
+            </a:extLst>
+          </a:blip>
+          <a:srcRect t="-10646" b="-10646"/>
+          <a:stretch>
+            <a:fillRect/>
+          </a:stretch>
+        </p:blipFill>
+        <p:spPr/>
+      </p:pic>
+    </p:spTree>
+    <p:extLst>
+      <p:ext uri="{BB962C8B-B14F-4D97-AF65-F5344CB8AC3E}">
+        <p14:creationId xmlns:p14="http://schemas.microsoft.com/office/powerpoint/2010/main" val="2698281727"/>
+      </p:ext>
+    </p:extLst>
+  </p:cSld>
+  <p:clrMapOvr>
+    <a:masterClrMapping/>
+  </p:clrMapOvr>
+</p:sld>
+</file>
+
 <file path=ppt/theme/theme1.xml><?xml version="1.0" encoding="utf-8"?>
 <a:theme xmlns:a="http://schemas.openxmlformats.org/drawingml/2006/main" name="Office Theme">
   <a:themeElements>

</xml_diff>

<commit_message>
week 3 ppt: added some hw comments
</commit_message>
<xml_diff>
--- a/Week3/ppt_section3.pptx
+++ b/Week3/ppt_section3.pptx
@@ -9,6 +9,9 @@
     <p:sldId id="261" r:id="rId3"/>
     <p:sldId id="260" r:id="rId4"/>
     <p:sldId id="262" r:id="rId5"/>
+    <p:sldId id="263" r:id="rId6"/>
+    <p:sldId id="264" r:id="rId7"/>
+    <p:sldId id="265" r:id="rId8"/>
   </p:sldIdLst>
   <p:sldSz cx="9144000" cy="6858000" type="screen4x3"/>
   <p:notesSz cx="6858000" cy="9144000"/>
@@ -3843,6 +3846,240 @@
 </p:sld>
 </file>
 
+<file path=ppt/slides/slide5.xml><?xml version="1.0" encoding="utf-8"?>
+<p:sld xmlns:a="http://schemas.openxmlformats.org/drawingml/2006/main" xmlns:r="http://schemas.openxmlformats.org/officeDocument/2006/relationships" xmlns:p="http://schemas.openxmlformats.org/presentationml/2006/main">
+  <p:cSld>
+    <p:spTree>
+      <p:nvGrpSpPr>
+        <p:cNvPr id="1" name=""/>
+        <p:cNvGrpSpPr/>
+        <p:nvPr/>
+      </p:nvGrpSpPr>
+      <p:grpSpPr>
+        <a:xfrm>
+          <a:off x="0" y="0"/>
+          <a:ext cx="0" cy="0"/>
+          <a:chOff x="0" y="0"/>
+          <a:chExt cx="0" cy="0"/>
+        </a:xfrm>
+      </p:grpSpPr>
+      <p:sp>
+        <p:nvSpPr>
+          <p:cNvPr id="2" name="Title 1"/>
+          <p:cNvSpPr>
+            <a:spLocks noGrp="1"/>
+          </p:cNvSpPr>
+          <p:nvPr>
+            <p:ph type="title"/>
+          </p:nvPr>
+        </p:nvSpPr>
+        <p:spPr/>
+        <p:txBody>
+          <a:bodyPr/>
+          <a:lstStyle/>
+          <a:p>
+            <a:r>
+              <a:rPr lang="en-US" dirty="0" smtClean="0"/>
+              <a:t>HW: Describing Results</a:t>
+            </a:r>
+            <a:endParaRPr lang="en-US" dirty="0"/>
+          </a:p>
+        </p:txBody>
+      </p:sp>
+      <p:pic>
+        <p:nvPicPr>
+          <p:cNvPr id="4" name="Content Placeholder 3" descr="Screen Shot 2013-10-09 at 1.23.18 PM.png"/>
+          <p:cNvPicPr>
+            <a:picLocks noGrp="1" noChangeAspect="1"/>
+          </p:cNvPicPr>
+          <p:nvPr>
+            <p:ph idx="1"/>
+          </p:nvPr>
+        </p:nvPicPr>
+        <p:blipFill>
+          <a:blip r:embed="rId2">
+            <a:extLst>
+              <a:ext uri="{28A0092B-C50C-407E-A947-70E740481C1C}">
+                <a14:useLocalDpi xmlns:a14="http://schemas.microsoft.com/office/drawing/2010/main" val="0"/>
+              </a:ext>
+            </a:extLst>
+          </a:blip>
+          <a:srcRect l="-7848" r="-7848"/>
+          <a:stretch>
+            <a:fillRect/>
+          </a:stretch>
+        </p:blipFill>
+        <p:spPr/>
+      </p:pic>
+    </p:spTree>
+    <p:extLst>
+      <p:ext uri="{BB962C8B-B14F-4D97-AF65-F5344CB8AC3E}">
+        <p14:creationId xmlns:p14="http://schemas.microsoft.com/office/powerpoint/2010/main" val="1147608772"/>
+      </p:ext>
+    </p:extLst>
+  </p:cSld>
+  <p:clrMapOvr>
+    <a:masterClrMapping/>
+  </p:clrMapOvr>
+</p:sld>
+</file>
+
+<file path=ppt/slides/slide6.xml><?xml version="1.0" encoding="utf-8"?>
+<p:sld xmlns:a="http://schemas.openxmlformats.org/drawingml/2006/main" xmlns:r="http://schemas.openxmlformats.org/officeDocument/2006/relationships" xmlns:p="http://schemas.openxmlformats.org/presentationml/2006/main">
+  <p:cSld>
+    <p:spTree>
+      <p:nvGrpSpPr>
+        <p:cNvPr id="1" name=""/>
+        <p:cNvGrpSpPr/>
+        <p:nvPr/>
+      </p:nvGrpSpPr>
+      <p:grpSpPr>
+        <a:xfrm>
+          <a:off x="0" y="0"/>
+          <a:ext cx="0" cy="0"/>
+          <a:chOff x="0" y="0"/>
+          <a:chExt cx="0" cy="0"/>
+        </a:xfrm>
+      </p:grpSpPr>
+      <p:sp>
+        <p:nvSpPr>
+          <p:cNvPr id="2" name="Title 1"/>
+          <p:cNvSpPr>
+            <a:spLocks noGrp="1"/>
+          </p:cNvSpPr>
+          <p:nvPr>
+            <p:ph type="title"/>
+          </p:nvPr>
+        </p:nvSpPr>
+        <p:spPr/>
+        <p:txBody>
+          <a:bodyPr/>
+          <a:lstStyle/>
+          <a:p>
+            <a:r>
+              <a:rPr lang="en-US" dirty="0" smtClean="0"/>
+              <a:t>Example 1</a:t>
+            </a:r>
+            <a:endParaRPr lang="en-US" dirty="0"/>
+          </a:p>
+        </p:txBody>
+      </p:sp>
+      <p:pic>
+        <p:nvPicPr>
+          <p:cNvPr id="4" name="Content Placeholder 3" descr="Screen Shot 2013-10-09 at 1.23.48 PM.png"/>
+          <p:cNvPicPr>
+            <a:picLocks noGrp="1" noChangeAspect="1"/>
+          </p:cNvPicPr>
+          <p:nvPr>
+            <p:ph idx="1"/>
+          </p:nvPr>
+        </p:nvPicPr>
+        <p:blipFill>
+          <a:blip r:embed="rId2">
+            <a:extLst>
+              <a:ext uri="{28A0092B-C50C-407E-A947-70E740481C1C}">
+                <a14:useLocalDpi xmlns:a14="http://schemas.microsoft.com/office/drawing/2010/main" val="0"/>
+              </a:ext>
+            </a:extLst>
+          </a:blip>
+          <a:srcRect t="-1957" b="-1957"/>
+          <a:stretch>
+            <a:fillRect/>
+          </a:stretch>
+        </p:blipFill>
+        <p:spPr/>
+      </p:pic>
+    </p:spTree>
+    <p:extLst>
+      <p:ext uri="{BB962C8B-B14F-4D97-AF65-F5344CB8AC3E}">
+        <p14:creationId xmlns:p14="http://schemas.microsoft.com/office/powerpoint/2010/main" val="3794436793"/>
+      </p:ext>
+    </p:extLst>
+  </p:cSld>
+  <p:clrMapOvr>
+    <a:masterClrMapping/>
+  </p:clrMapOvr>
+</p:sld>
+</file>
+
+<file path=ppt/slides/slide7.xml><?xml version="1.0" encoding="utf-8"?>
+<p:sld xmlns:a="http://schemas.openxmlformats.org/drawingml/2006/main" xmlns:r="http://schemas.openxmlformats.org/officeDocument/2006/relationships" xmlns:p="http://schemas.openxmlformats.org/presentationml/2006/main">
+  <p:cSld>
+    <p:spTree>
+      <p:nvGrpSpPr>
+        <p:cNvPr id="1" name=""/>
+        <p:cNvGrpSpPr/>
+        <p:nvPr/>
+      </p:nvGrpSpPr>
+      <p:grpSpPr>
+        <a:xfrm>
+          <a:off x="0" y="0"/>
+          <a:ext cx="0" cy="0"/>
+          <a:chOff x="0" y="0"/>
+          <a:chExt cx="0" cy="0"/>
+        </a:xfrm>
+      </p:grpSpPr>
+      <p:sp>
+        <p:nvSpPr>
+          <p:cNvPr id="2" name="Title 1"/>
+          <p:cNvSpPr>
+            <a:spLocks noGrp="1"/>
+          </p:cNvSpPr>
+          <p:nvPr>
+            <p:ph type="title"/>
+          </p:nvPr>
+        </p:nvSpPr>
+        <p:spPr/>
+        <p:txBody>
+          <a:bodyPr/>
+          <a:lstStyle/>
+          <a:p>
+            <a:r>
+              <a:rPr lang="en-US" dirty="0" smtClean="0"/>
+              <a:t>Example 2</a:t>
+            </a:r>
+            <a:endParaRPr lang="en-US" dirty="0"/>
+          </a:p>
+        </p:txBody>
+      </p:sp>
+      <p:pic>
+        <p:nvPicPr>
+          <p:cNvPr id="4" name="Content Placeholder 3" descr="Screen Shot 2013-10-09 at 1.23.55 PM.png"/>
+          <p:cNvPicPr>
+            <a:picLocks noGrp="1" noChangeAspect="1"/>
+          </p:cNvPicPr>
+          <p:nvPr>
+            <p:ph idx="1"/>
+          </p:nvPr>
+        </p:nvPicPr>
+        <p:blipFill>
+          <a:blip r:embed="rId2">
+            <a:extLst>
+              <a:ext uri="{28A0092B-C50C-407E-A947-70E740481C1C}">
+                <a14:useLocalDpi xmlns:a14="http://schemas.microsoft.com/office/drawing/2010/main" val="0"/>
+              </a:ext>
+            </a:extLst>
+          </a:blip>
+          <a:srcRect t="-1619" b="-1619"/>
+          <a:stretch>
+            <a:fillRect/>
+          </a:stretch>
+        </p:blipFill>
+        <p:spPr/>
+      </p:pic>
+    </p:spTree>
+    <p:extLst>
+      <p:ext uri="{BB962C8B-B14F-4D97-AF65-F5344CB8AC3E}">
+        <p14:creationId xmlns:p14="http://schemas.microsoft.com/office/powerpoint/2010/main" val="4028335683"/>
+      </p:ext>
+    </p:extLst>
+  </p:cSld>
+  <p:clrMapOvr>
+    <a:masterClrMapping/>
+  </p:clrMapOvr>
+</p:sld>
+</file>
+
 <file path=ppt/theme/theme1.xml><?xml version="1.0" encoding="utf-8"?>
 <a:theme xmlns:a="http://schemas.openxmlformats.org/drawingml/2006/main" name="Office Theme">
   <a:themeElements>

</xml_diff>

<commit_message>
more to what type of test to use
</commit_message>
<xml_diff>
--- a/Week3/ppt_section3.pptx
+++ b/Week3/ppt_section3.pptx
@@ -6,12 +6,14 @@
   </p:sldMasterIdLst>
   <p:sldIdLst>
     <p:sldId id="258" r:id="rId2"/>
-    <p:sldId id="261" r:id="rId3"/>
-    <p:sldId id="260" r:id="rId4"/>
-    <p:sldId id="262" r:id="rId5"/>
-    <p:sldId id="263" r:id="rId6"/>
-    <p:sldId id="264" r:id="rId7"/>
-    <p:sldId id="265" r:id="rId8"/>
+    <p:sldId id="266" r:id="rId3"/>
+    <p:sldId id="267" r:id="rId4"/>
+    <p:sldId id="261" r:id="rId5"/>
+    <p:sldId id="260" r:id="rId6"/>
+    <p:sldId id="262" r:id="rId7"/>
+    <p:sldId id="263" r:id="rId8"/>
+    <p:sldId id="264" r:id="rId9"/>
+    <p:sldId id="265" r:id="rId10"/>
   </p:sldIdLst>
   <p:sldSz cx="9144000" cy="6858000" type="screen4x3"/>
   <p:notesSz cx="6858000" cy="9144000"/>
@@ -3169,6 +3171,212 @@
 </file>
 
 <file path=ppt/slides/slide2.xml><?xml version="1.0" encoding="utf-8"?>
+<p:sld xmlns:a="http://schemas.openxmlformats.org/drawingml/2006/main" xmlns:r="http://schemas.openxmlformats.org/officeDocument/2006/relationships" xmlns:p="http://schemas.openxmlformats.org/presentationml/2006/main">
+  <p:cSld>
+    <p:spTree>
+      <p:nvGrpSpPr>
+        <p:cNvPr id="1" name=""/>
+        <p:cNvGrpSpPr/>
+        <p:nvPr/>
+      </p:nvGrpSpPr>
+      <p:grpSpPr>
+        <a:xfrm>
+          <a:off x="0" y="0"/>
+          <a:ext cx="0" cy="0"/>
+          <a:chOff x="0" y="0"/>
+          <a:chExt cx="0" cy="0"/>
+        </a:xfrm>
+      </p:grpSpPr>
+      <p:sp>
+        <p:nvSpPr>
+          <p:cNvPr id="2" name="Title 1"/>
+          <p:cNvSpPr>
+            <a:spLocks noGrp="1"/>
+          </p:cNvSpPr>
+          <p:nvPr>
+            <p:ph type="title"/>
+          </p:nvPr>
+        </p:nvSpPr>
+        <p:spPr/>
+        <p:txBody>
+          <a:bodyPr>
+            <a:normAutofit fontScale="90000"/>
+          </a:bodyPr>
+          <a:lstStyle/>
+          <a:p>
+            <a:r>
+              <a:rPr lang="en-US" dirty="0" smtClean="0"/>
+              <a:t>Quantitative Outcome Variable (DV)</a:t>
+            </a:r>
+            <a:endParaRPr lang="en-US" dirty="0"/>
+          </a:p>
+        </p:txBody>
+      </p:sp>
+      <p:pic>
+        <p:nvPicPr>
+          <p:cNvPr id="3" name="Picture 2" descr="Screen Shot 2013-10-09 at 1.26.28 PM.png"/>
+          <p:cNvPicPr>
+            <a:picLocks noChangeAspect="1"/>
+          </p:cNvPicPr>
+          <p:nvPr/>
+        </p:nvPicPr>
+        <p:blipFill>
+          <a:blip r:embed="rId2">
+            <a:extLst>
+              <a:ext uri="{28A0092B-C50C-407E-A947-70E740481C1C}">
+                <a14:useLocalDpi xmlns:a14="http://schemas.microsoft.com/office/drawing/2010/main" val="0"/>
+              </a:ext>
+            </a:extLst>
+          </a:blip>
+          <a:stretch>
+            <a:fillRect/>
+          </a:stretch>
+        </p:blipFill>
+        <p:spPr>
+          <a:xfrm>
+            <a:off x="219487" y="1771830"/>
+            <a:ext cx="8580937" cy="4430197"/>
+          </a:xfrm>
+          <a:prstGeom prst="rect">
+            <a:avLst/>
+          </a:prstGeom>
+        </p:spPr>
+      </p:pic>
+      <p:sp>
+        <p:nvSpPr>
+          <p:cNvPr id="4" name="TextBox 3"/>
+          <p:cNvSpPr txBox="1"/>
+          <p:nvPr/>
+        </p:nvSpPr>
+        <p:spPr>
+          <a:xfrm>
+            <a:off x="3793992" y="3860167"/>
+            <a:ext cx="1881323" cy="246221"/>
+          </a:xfrm>
+          <a:prstGeom prst="rect">
+            <a:avLst/>
+          </a:prstGeom>
+          <a:noFill/>
+        </p:spPr>
+        <p:txBody>
+          <a:bodyPr wrap="square" rtlCol="0">
+            <a:spAutoFit/>
+          </a:bodyPr>
+          <a:lstStyle/>
+          <a:p>
+            <a:r>
+              <a:rPr lang="en-US" sz="1000" dirty="0" smtClean="0">
+                <a:solidFill>
+                  <a:schemeClr val="bg1"/>
+                </a:solidFill>
+              </a:rPr>
+              <a:t>* (or code as quant. (lm )</a:t>
+            </a:r>
+            <a:endParaRPr lang="en-US" sz="1000" dirty="0">
+              <a:solidFill>
+                <a:schemeClr val="bg1"/>
+              </a:solidFill>
+            </a:endParaRPr>
+          </a:p>
+        </p:txBody>
+      </p:sp>
+    </p:spTree>
+    <p:extLst>
+      <p:ext uri="{BB962C8B-B14F-4D97-AF65-F5344CB8AC3E}">
+        <p14:creationId xmlns:p14="http://schemas.microsoft.com/office/powerpoint/2010/main" val="1127784878"/>
+      </p:ext>
+    </p:extLst>
+  </p:cSld>
+  <p:clrMapOvr>
+    <a:masterClrMapping/>
+  </p:clrMapOvr>
+</p:sld>
+</file>
+
+<file path=ppt/slides/slide3.xml><?xml version="1.0" encoding="utf-8"?>
+<p:sld xmlns:a="http://schemas.openxmlformats.org/drawingml/2006/main" xmlns:r="http://schemas.openxmlformats.org/officeDocument/2006/relationships" xmlns:p="http://schemas.openxmlformats.org/presentationml/2006/main">
+  <p:cSld>
+    <p:spTree>
+      <p:nvGrpSpPr>
+        <p:cNvPr id="1" name=""/>
+        <p:cNvGrpSpPr/>
+        <p:nvPr/>
+      </p:nvGrpSpPr>
+      <p:grpSpPr>
+        <a:xfrm>
+          <a:off x="0" y="0"/>
+          <a:ext cx="0" cy="0"/>
+          <a:chOff x="0" y="0"/>
+          <a:chExt cx="0" cy="0"/>
+        </a:xfrm>
+      </p:grpSpPr>
+      <p:sp>
+        <p:nvSpPr>
+          <p:cNvPr id="2" name="Title 1"/>
+          <p:cNvSpPr>
+            <a:spLocks noGrp="1"/>
+          </p:cNvSpPr>
+          <p:nvPr>
+            <p:ph type="title"/>
+          </p:nvPr>
+        </p:nvSpPr>
+        <p:spPr/>
+        <p:txBody>
+          <a:bodyPr/>
+          <a:lstStyle/>
+          <a:p>
+            <a:r>
+              <a:rPr lang="en-US" dirty="0" smtClean="0"/>
+              <a:t>Categorical Outcome Variable (DV)</a:t>
+            </a:r>
+            <a:endParaRPr lang="en-US" dirty="0"/>
+          </a:p>
+        </p:txBody>
+      </p:sp>
+      <p:pic>
+        <p:nvPicPr>
+          <p:cNvPr id="3" name="Picture 2" descr="Screen Shot 2013-10-09 at 1.29.06 PM.png"/>
+          <p:cNvPicPr>
+            <a:picLocks noChangeAspect="1"/>
+          </p:cNvPicPr>
+          <p:nvPr/>
+        </p:nvPicPr>
+        <p:blipFill>
+          <a:blip r:embed="rId2">
+            <a:extLst>
+              <a:ext uri="{28A0092B-C50C-407E-A947-70E740481C1C}">
+                <a14:useLocalDpi xmlns:a14="http://schemas.microsoft.com/office/drawing/2010/main" val="0"/>
+              </a:ext>
+            </a:extLst>
+          </a:blip>
+          <a:stretch>
+            <a:fillRect/>
+          </a:stretch>
+        </p:blipFill>
+        <p:spPr>
+          <a:xfrm>
+            <a:off x="278252" y="1771830"/>
+            <a:ext cx="8486938" cy="4316914"/>
+          </a:xfrm>
+          <a:prstGeom prst="rect">
+            <a:avLst/>
+          </a:prstGeom>
+        </p:spPr>
+      </p:pic>
+    </p:spTree>
+    <p:extLst>
+      <p:ext uri="{BB962C8B-B14F-4D97-AF65-F5344CB8AC3E}">
+        <p14:creationId xmlns:p14="http://schemas.microsoft.com/office/powerpoint/2010/main" val="600655316"/>
+      </p:ext>
+    </p:extLst>
+  </p:cSld>
+  <p:clrMapOvr>
+    <a:masterClrMapping/>
+  </p:clrMapOvr>
+</p:sld>
+</file>
+
+<file path=ppt/slides/slide4.xml><?xml version="1.0" encoding="utf-8"?>
 <p:sld xmlns:a="http://schemas.openxmlformats.org/drawingml/2006/main" xmlns:r="http://schemas.openxmlformats.org/officeDocument/2006/relationships" xmlns:p="http://schemas.openxmlformats.org/presentationml/2006/main">
   <p:cSld>
     <p:spTree>
@@ -3691,7 +3899,7 @@
 </p:sld>
 </file>
 
-<file path=ppt/slides/slide3.xml><?xml version="1.0" encoding="utf-8"?>
+<file path=ppt/slides/slide5.xml><?xml version="1.0" encoding="utf-8"?>
 <p:sld xmlns:a="http://schemas.openxmlformats.org/drawingml/2006/main" xmlns:r="http://schemas.openxmlformats.org/officeDocument/2006/relationships" xmlns:p="http://schemas.openxmlformats.org/presentationml/2006/main">
   <p:cSld>
     <p:spTree>
@@ -3768,162 +3976,6 @@
 </p:sld>
 </file>
 
-<file path=ppt/slides/slide4.xml><?xml version="1.0" encoding="utf-8"?>
-<p:sld xmlns:a="http://schemas.openxmlformats.org/drawingml/2006/main" xmlns:r="http://schemas.openxmlformats.org/officeDocument/2006/relationships" xmlns:p="http://schemas.openxmlformats.org/presentationml/2006/main">
-  <p:cSld>
-    <p:spTree>
-      <p:nvGrpSpPr>
-        <p:cNvPr id="1" name=""/>
-        <p:cNvGrpSpPr/>
-        <p:nvPr/>
-      </p:nvGrpSpPr>
-      <p:grpSpPr>
-        <a:xfrm>
-          <a:off x="0" y="0"/>
-          <a:ext cx="0" cy="0"/>
-          <a:chOff x="0" y="0"/>
-          <a:chExt cx="0" cy="0"/>
-        </a:xfrm>
-      </p:grpSpPr>
-      <p:sp>
-        <p:nvSpPr>
-          <p:cNvPr id="2" name="Title 1"/>
-          <p:cNvSpPr>
-            <a:spLocks noGrp="1"/>
-          </p:cNvSpPr>
-          <p:nvPr>
-            <p:ph type="title"/>
-          </p:nvPr>
-        </p:nvSpPr>
-        <p:spPr/>
-        <p:txBody>
-          <a:bodyPr/>
-          <a:lstStyle/>
-          <a:p>
-            <a:r>
-              <a:rPr lang="en-US" dirty="0" smtClean="0"/>
-              <a:t>Reporting Statistics</a:t>
-            </a:r>
-            <a:endParaRPr lang="en-US" dirty="0"/>
-          </a:p>
-        </p:txBody>
-      </p:sp>
-      <p:pic>
-        <p:nvPicPr>
-          <p:cNvPr id="4" name="Content Placeholder 3" descr="Screen Shot 2013-10-09 at 1.21.49 PM.png"/>
-          <p:cNvPicPr>
-            <a:picLocks noGrp="1" noChangeAspect="1"/>
-          </p:cNvPicPr>
-          <p:nvPr>
-            <p:ph idx="1"/>
-          </p:nvPr>
-        </p:nvPicPr>
-        <p:blipFill>
-          <a:blip r:embed="rId2">
-            <a:extLst>
-              <a:ext uri="{28A0092B-C50C-407E-A947-70E740481C1C}">
-                <a14:useLocalDpi xmlns:a14="http://schemas.microsoft.com/office/drawing/2010/main" val="0"/>
-              </a:ext>
-            </a:extLst>
-          </a:blip>
-          <a:srcRect t="-10646" b="-10646"/>
-          <a:stretch>
-            <a:fillRect/>
-          </a:stretch>
-        </p:blipFill>
-        <p:spPr/>
-      </p:pic>
-    </p:spTree>
-    <p:extLst>
-      <p:ext uri="{BB962C8B-B14F-4D97-AF65-F5344CB8AC3E}">
-        <p14:creationId xmlns:p14="http://schemas.microsoft.com/office/powerpoint/2010/main" val="2698281727"/>
-      </p:ext>
-    </p:extLst>
-  </p:cSld>
-  <p:clrMapOvr>
-    <a:masterClrMapping/>
-  </p:clrMapOvr>
-</p:sld>
-</file>
-
-<file path=ppt/slides/slide5.xml><?xml version="1.0" encoding="utf-8"?>
-<p:sld xmlns:a="http://schemas.openxmlformats.org/drawingml/2006/main" xmlns:r="http://schemas.openxmlformats.org/officeDocument/2006/relationships" xmlns:p="http://schemas.openxmlformats.org/presentationml/2006/main">
-  <p:cSld>
-    <p:spTree>
-      <p:nvGrpSpPr>
-        <p:cNvPr id="1" name=""/>
-        <p:cNvGrpSpPr/>
-        <p:nvPr/>
-      </p:nvGrpSpPr>
-      <p:grpSpPr>
-        <a:xfrm>
-          <a:off x="0" y="0"/>
-          <a:ext cx="0" cy="0"/>
-          <a:chOff x="0" y="0"/>
-          <a:chExt cx="0" cy="0"/>
-        </a:xfrm>
-      </p:grpSpPr>
-      <p:sp>
-        <p:nvSpPr>
-          <p:cNvPr id="2" name="Title 1"/>
-          <p:cNvSpPr>
-            <a:spLocks noGrp="1"/>
-          </p:cNvSpPr>
-          <p:nvPr>
-            <p:ph type="title"/>
-          </p:nvPr>
-        </p:nvSpPr>
-        <p:spPr/>
-        <p:txBody>
-          <a:bodyPr/>
-          <a:lstStyle/>
-          <a:p>
-            <a:r>
-              <a:rPr lang="en-US" dirty="0" smtClean="0"/>
-              <a:t>HW: Describing Results</a:t>
-            </a:r>
-            <a:endParaRPr lang="en-US" dirty="0"/>
-          </a:p>
-        </p:txBody>
-      </p:sp>
-      <p:pic>
-        <p:nvPicPr>
-          <p:cNvPr id="4" name="Content Placeholder 3" descr="Screen Shot 2013-10-09 at 1.23.18 PM.png"/>
-          <p:cNvPicPr>
-            <a:picLocks noGrp="1" noChangeAspect="1"/>
-          </p:cNvPicPr>
-          <p:nvPr>
-            <p:ph idx="1"/>
-          </p:nvPr>
-        </p:nvPicPr>
-        <p:blipFill>
-          <a:blip r:embed="rId2">
-            <a:extLst>
-              <a:ext uri="{28A0092B-C50C-407E-A947-70E740481C1C}">
-                <a14:useLocalDpi xmlns:a14="http://schemas.microsoft.com/office/drawing/2010/main" val="0"/>
-              </a:ext>
-            </a:extLst>
-          </a:blip>
-          <a:srcRect l="-7848" r="-7848"/>
-          <a:stretch>
-            <a:fillRect/>
-          </a:stretch>
-        </p:blipFill>
-        <p:spPr/>
-      </p:pic>
-    </p:spTree>
-    <p:extLst>
-      <p:ext uri="{BB962C8B-B14F-4D97-AF65-F5344CB8AC3E}">
-        <p14:creationId xmlns:p14="http://schemas.microsoft.com/office/powerpoint/2010/main" val="1147608772"/>
-      </p:ext>
-    </p:extLst>
-  </p:cSld>
-  <p:clrMapOvr>
-    <a:masterClrMapping/>
-  </p:clrMapOvr>
-</p:sld>
-</file>
-
 <file path=ppt/slides/slide6.xml><?xml version="1.0" encoding="utf-8"?>
 <p:sld xmlns:a="http://schemas.openxmlformats.org/drawingml/2006/main" xmlns:r="http://schemas.openxmlformats.org/officeDocument/2006/relationships" xmlns:p="http://schemas.openxmlformats.org/presentationml/2006/main">
   <p:cSld>
@@ -3958,6 +4010,162 @@
           <a:p>
             <a:r>
               <a:rPr lang="en-US" dirty="0" smtClean="0"/>
+              <a:t>Reporting Statistics</a:t>
+            </a:r>
+            <a:endParaRPr lang="en-US" dirty="0"/>
+          </a:p>
+        </p:txBody>
+      </p:sp>
+      <p:pic>
+        <p:nvPicPr>
+          <p:cNvPr id="4" name="Content Placeholder 3" descr="Screen Shot 2013-10-09 at 1.21.49 PM.png"/>
+          <p:cNvPicPr>
+            <a:picLocks noGrp="1" noChangeAspect="1"/>
+          </p:cNvPicPr>
+          <p:nvPr>
+            <p:ph idx="1"/>
+          </p:nvPr>
+        </p:nvPicPr>
+        <p:blipFill>
+          <a:blip r:embed="rId2">
+            <a:extLst>
+              <a:ext uri="{28A0092B-C50C-407E-A947-70E740481C1C}">
+                <a14:useLocalDpi xmlns:a14="http://schemas.microsoft.com/office/drawing/2010/main" val="0"/>
+              </a:ext>
+            </a:extLst>
+          </a:blip>
+          <a:srcRect t="-10646" b="-10646"/>
+          <a:stretch>
+            <a:fillRect/>
+          </a:stretch>
+        </p:blipFill>
+        <p:spPr/>
+      </p:pic>
+    </p:spTree>
+    <p:extLst>
+      <p:ext uri="{BB962C8B-B14F-4D97-AF65-F5344CB8AC3E}">
+        <p14:creationId xmlns:p14="http://schemas.microsoft.com/office/powerpoint/2010/main" val="2698281727"/>
+      </p:ext>
+    </p:extLst>
+  </p:cSld>
+  <p:clrMapOvr>
+    <a:masterClrMapping/>
+  </p:clrMapOvr>
+</p:sld>
+</file>
+
+<file path=ppt/slides/slide7.xml><?xml version="1.0" encoding="utf-8"?>
+<p:sld xmlns:a="http://schemas.openxmlformats.org/drawingml/2006/main" xmlns:r="http://schemas.openxmlformats.org/officeDocument/2006/relationships" xmlns:p="http://schemas.openxmlformats.org/presentationml/2006/main">
+  <p:cSld>
+    <p:spTree>
+      <p:nvGrpSpPr>
+        <p:cNvPr id="1" name=""/>
+        <p:cNvGrpSpPr/>
+        <p:nvPr/>
+      </p:nvGrpSpPr>
+      <p:grpSpPr>
+        <a:xfrm>
+          <a:off x="0" y="0"/>
+          <a:ext cx="0" cy="0"/>
+          <a:chOff x="0" y="0"/>
+          <a:chExt cx="0" cy="0"/>
+        </a:xfrm>
+      </p:grpSpPr>
+      <p:sp>
+        <p:nvSpPr>
+          <p:cNvPr id="2" name="Title 1"/>
+          <p:cNvSpPr>
+            <a:spLocks noGrp="1"/>
+          </p:cNvSpPr>
+          <p:nvPr>
+            <p:ph type="title"/>
+          </p:nvPr>
+        </p:nvSpPr>
+        <p:spPr/>
+        <p:txBody>
+          <a:bodyPr/>
+          <a:lstStyle/>
+          <a:p>
+            <a:r>
+              <a:rPr lang="en-US" dirty="0" smtClean="0"/>
+              <a:t>HW: Describing Results</a:t>
+            </a:r>
+            <a:endParaRPr lang="en-US" dirty="0"/>
+          </a:p>
+        </p:txBody>
+      </p:sp>
+      <p:pic>
+        <p:nvPicPr>
+          <p:cNvPr id="4" name="Content Placeholder 3" descr="Screen Shot 2013-10-09 at 1.23.18 PM.png"/>
+          <p:cNvPicPr>
+            <a:picLocks noGrp="1" noChangeAspect="1"/>
+          </p:cNvPicPr>
+          <p:nvPr>
+            <p:ph idx="1"/>
+          </p:nvPr>
+        </p:nvPicPr>
+        <p:blipFill>
+          <a:blip r:embed="rId2">
+            <a:extLst>
+              <a:ext uri="{28A0092B-C50C-407E-A947-70E740481C1C}">
+                <a14:useLocalDpi xmlns:a14="http://schemas.microsoft.com/office/drawing/2010/main" val="0"/>
+              </a:ext>
+            </a:extLst>
+          </a:blip>
+          <a:srcRect l="-7848" r="-7848"/>
+          <a:stretch>
+            <a:fillRect/>
+          </a:stretch>
+        </p:blipFill>
+        <p:spPr/>
+      </p:pic>
+    </p:spTree>
+    <p:extLst>
+      <p:ext uri="{BB962C8B-B14F-4D97-AF65-F5344CB8AC3E}">
+        <p14:creationId xmlns:p14="http://schemas.microsoft.com/office/powerpoint/2010/main" val="1147608772"/>
+      </p:ext>
+    </p:extLst>
+  </p:cSld>
+  <p:clrMapOvr>
+    <a:masterClrMapping/>
+  </p:clrMapOvr>
+</p:sld>
+</file>
+
+<file path=ppt/slides/slide8.xml><?xml version="1.0" encoding="utf-8"?>
+<p:sld xmlns:a="http://schemas.openxmlformats.org/drawingml/2006/main" xmlns:r="http://schemas.openxmlformats.org/officeDocument/2006/relationships" xmlns:p="http://schemas.openxmlformats.org/presentationml/2006/main">
+  <p:cSld>
+    <p:spTree>
+      <p:nvGrpSpPr>
+        <p:cNvPr id="1" name=""/>
+        <p:cNvGrpSpPr/>
+        <p:nvPr/>
+      </p:nvGrpSpPr>
+      <p:grpSpPr>
+        <a:xfrm>
+          <a:off x="0" y="0"/>
+          <a:ext cx="0" cy="0"/>
+          <a:chOff x="0" y="0"/>
+          <a:chExt cx="0" cy="0"/>
+        </a:xfrm>
+      </p:grpSpPr>
+      <p:sp>
+        <p:nvSpPr>
+          <p:cNvPr id="2" name="Title 1"/>
+          <p:cNvSpPr>
+            <a:spLocks noGrp="1"/>
+          </p:cNvSpPr>
+          <p:nvPr>
+            <p:ph type="title"/>
+          </p:nvPr>
+        </p:nvSpPr>
+        <p:spPr/>
+        <p:txBody>
+          <a:bodyPr/>
+          <a:lstStyle/>
+          <a:p>
+            <a:r>
+              <a:rPr lang="en-US" dirty="0" smtClean="0"/>
               <a:t>Example 1</a:t>
             </a:r>
             <a:endParaRPr lang="en-US" dirty="0"/>
@@ -4002,7 +4210,7 @@
 </p:sld>
 </file>
 
-<file path=ppt/slides/slide7.xml><?xml version="1.0" encoding="utf-8"?>
+<file path=ppt/slides/slide9.xml><?xml version="1.0" encoding="utf-8"?>
 <p:sld xmlns:a="http://schemas.openxmlformats.org/drawingml/2006/main" xmlns:r="http://schemas.openxmlformats.org/officeDocument/2006/relationships" xmlns:p="http://schemas.openxmlformats.org/presentationml/2006/main">
   <p:cSld>
     <p:spTree>

</xml_diff>